<commit_message>
Documents and auxiliary files
</commit_message>
<xml_diff>
--- a/doc/SCALLOP_INF1-080319.pptx
+++ b/doc/SCALLOP_INF1-080319.pptx
@@ -3418,11 +3418,7 @@
           <a:p>
             <a:r>
               <a:rPr lang="en-GB" dirty="0" smtClean="0"/>
-              <a:t>8</a:t>
-            </a:r>
-            <a:r>
-              <a:rPr lang="en-GB" dirty="0" smtClean="0"/>
-              <a:t>/3/2019</a:t>
+              <a:t>8/3/2019</a:t>
             </a:r>
             <a:endParaRPr lang="en-GB" dirty="0"/>
           </a:p>
@@ -3480,11 +3476,7 @@
             </a:r>
             <a:r>
               <a:rPr lang="en-GB" b="1" dirty="0"/>
-              <a:t>brief </a:t>
-            </a:r>
-            <a:r>
-              <a:rPr lang="en-GB" b="1" dirty="0"/>
-              <a:t>summary (</a:t>
+              <a:t>brief summary (</a:t>
             </a:r>
             <a:r>
               <a:rPr lang="en-GB" b="1" dirty="0" smtClean="0"/>
@@ -3600,11 +3592,7 @@
             </a:r>
             <a:r>
               <a:rPr lang="en-GB" b="1" dirty="0"/>
-              <a:t>next </a:t>
-            </a:r>
-            <a:r>
-              <a:rPr lang="en-GB" b="1" dirty="0"/>
-              <a:t>steps (</a:t>
+              <a:t>next steps (</a:t>
             </a:r>
             <a:r>
               <a:rPr lang="en-GB" b="1" dirty="0" smtClean="0"/>
@@ -3799,13 +3787,20 @@
           <a:p>
             <a:r>
               <a:rPr lang="en-GB" dirty="0" smtClean="0"/>
-              <a:t>29 chromosomes remain to be analysed for KORA + ARTN reanalysing at TRYGGVE (smaller size). n</a:t>
+              <a:t>29 chromosomes remain to be analysed for KORA + ARTN reanalysing at TRYGGVE (smaller size). normalised level </a:t>
+            </a:r>
+            <a:r>
+              <a:rPr lang="en-GB" smtClean="0"/>
+              <a:t>~ </a:t>
+            </a:r>
+            <a:r>
+              <a:rPr lang="en-GB" smtClean="0"/>
+              <a:t>age+sex+PC1-5+genotype </a:t>
             </a:r>
             <a:r>
               <a:rPr lang="en-GB" dirty="0" smtClean="0"/>
-              <a:t>ormalised level ~ age+sex+PC1-4+genotype under additive model with SNPTEST.</a:t>
-            </a:r>
-            <a:endParaRPr lang="en-GB" dirty="0" smtClean="0"/>
+              <a:t>under additive model with SNPTEST.</a:t>
+            </a:r>
           </a:p>
           <a:p>
             <a:r>

</xml_diff>